<commit_message>
Updated dates and HW keys
</commit_message>
<xml_diff>
--- a/modules/IVRegression/PPT.pptx
+++ b/modules/IVRegression/PPT.pptx
@@ -6750,77 +6750,117 @@
           <a:lstStyle/>
           <a:p>
             <a:r>
-              <a:rPr lang="en-US"/>
+              <a:rPr lang="en-US" dirty="0"/>
               <a:t>Hartman and Brandt (1995) examined the relationship between energy density and percent dry weight for four species</a:t>
             </a:r>
           </a:p>
           <a:p>
             <a:pPr lvl="1"/>
             <a:r>
-              <a:rPr lang="en-US"/>
-              <a:t>bay ancovy (</a:t>
-            </a:r>
-            <a:r>
-              <a:rPr lang="en-US" i="1"/>
-              <a:t>Anchoa mitchilli</a:t>
-            </a:r>
-            <a:r>
-              <a:rPr lang="en-US"/>
+              <a:rPr lang="en-US" dirty="0"/>
+              <a:t>bay </a:t>
+            </a:r>
+            <a:r>
+              <a:rPr lang="en-US" dirty="0" smtClean="0"/>
+              <a:t>anchovy </a:t>
+            </a:r>
+            <a:r>
+              <a:rPr lang="en-US" dirty="0"/>
+              <a:t>(</a:t>
+            </a:r>
+            <a:r>
+              <a:rPr lang="en-US" i="1" dirty="0" err="1"/>
+              <a:t>Anchoa</a:t>
+            </a:r>
+            <a:r>
+              <a:rPr lang="en-US" i="1" dirty="0"/>
+              <a:t> </a:t>
+            </a:r>
+            <a:r>
+              <a:rPr lang="en-US" i="1" dirty="0" err="1"/>
+              <a:t>mitchilli</a:t>
+            </a:r>
+            <a:r>
+              <a:rPr lang="en-US" dirty="0"/>
               <a:t>),</a:t>
             </a:r>
           </a:p>
           <a:p>
             <a:pPr lvl="1"/>
             <a:r>
-              <a:rPr lang="en-US"/>
+              <a:rPr lang="en-US" dirty="0"/>
               <a:t>bluefish (</a:t>
             </a:r>
             <a:r>
-              <a:rPr lang="en-US" i="1"/>
-              <a:t>Pomatomus saltatrix</a:t>
-            </a:r>
-            <a:r>
-              <a:rPr lang="en-US"/>
+              <a:rPr lang="en-US" i="1" dirty="0" err="1"/>
+              <a:t>Pomatomus</a:t>
+            </a:r>
+            <a:r>
+              <a:rPr lang="en-US" i="1" dirty="0"/>
+              <a:t> </a:t>
+            </a:r>
+            <a:r>
+              <a:rPr lang="en-US" i="1" dirty="0" err="1"/>
+              <a:t>saltatrix</a:t>
+            </a:r>
+            <a:r>
+              <a:rPr lang="en-US" dirty="0"/>
               <a:t>),</a:t>
             </a:r>
           </a:p>
           <a:p>
             <a:pPr lvl="1"/>
             <a:r>
-              <a:rPr lang="en-US"/>
+              <a:rPr lang="en-US" dirty="0"/>
               <a:t>striped bass (</a:t>
             </a:r>
             <a:r>
-              <a:rPr lang="en-US" i="1"/>
-              <a:t>Morone saxatilis</a:t>
-            </a:r>
-            <a:r>
-              <a:rPr lang="en-US"/>
+              <a:rPr lang="en-US" i="1" dirty="0" err="1"/>
+              <a:t>Morone</a:t>
+            </a:r>
+            <a:r>
+              <a:rPr lang="en-US" i="1" dirty="0"/>
+              <a:t> </a:t>
+            </a:r>
+            <a:r>
+              <a:rPr lang="en-US" i="1" dirty="0" err="1"/>
+              <a:t>saxatilis</a:t>
+            </a:r>
+            <a:r>
+              <a:rPr lang="en-US" dirty="0"/>
               <a:t>), and</a:t>
             </a:r>
           </a:p>
           <a:p>
             <a:pPr lvl="1"/>
             <a:r>
-              <a:rPr lang="en-US"/>
+              <a:rPr lang="en-US" dirty="0"/>
               <a:t>weakfish (</a:t>
             </a:r>
             <a:r>
-              <a:rPr lang="en-US" i="1"/>
-              <a:t>Cynoscion regalis</a:t>
-            </a:r>
-            <a:r>
-              <a:rPr lang="en-US"/>
+              <a:rPr lang="en-US" i="1" dirty="0" err="1"/>
+              <a:t>Cynoscion</a:t>
+            </a:r>
+            <a:r>
+              <a:rPr lang="en-US" i="1" dirty="0"/>
+              <a:t> </a:t>
+            </a:r>
+            <a:r>
+              <a:rPr lang="en-US" i="1" dirty="0" err="1"/>
+              <a:t>regalis</a:t>
+            </a:r>
+            <a:r>
+              <a:rPr lang="en-US" dirty="0"/>
               <a:t>).</a:t>
             </a:r>
           </a:p>
           <a:p>
             <a:pPr lvl="1"/>
-            <a:endParaRPr lang="en-US"/>
-          </a:p>
-          <a:p>
-            <a:r>
-              <a:rPr lang="en-US"/>
+            <a:endParaRPr lang="en-US" dirty="0"/>
+          </a:p>
+          <a:p>
+            <a:r>
+              <a:rPr lang="en-US" dirty="0"/>
               <a:t>Describe relationship and determine if there are any differences among species.</a:t>
             </a:r>
           </a:p>

</xml_diff>

<commit_message>
Changed beta1 to beta
</commit_message>
<xml_diff>
--- a/modules/IVRegression/PPT.pptx
+++ b/modules/IVRegression/PPT.pptx
@@ -3865,14 +3865,12 @@
               <a:t>b</a:t>
             </a:r>
             <a:r>
-              <a:rPr lang="en-US" sz="2400" b="0" baseline="-25000" dirty="0" smtClean="0">
-                <a:latin typeface="Symbol" pitchFamily="18" charset="2"/>
-              </a:rPr>
-              <a:t>1</a:t>
-            </a:r>
-            <a:r>
               <a:rPr lang="en-US" sz="2400" b="0" dirty="0" smtClean="0"/>
-              <a:t> = slope of reference group</a:t>
+              <a:t> </a:t>
+            </a:r>
+            <a:r>
+              <a:rPr lang="en-US" sz="2400" b="0" dirty="0" smtClean="0"/>
+              <a:t>= slope of reference group</a:t>
             </a:r>
           </a:p>
           <a:p>
@@ -4698,207 +4696,99 @@
             </p:txBody>
           </p:sp>
         </p:grpSp>
-        <p:grpSp>
-          <p:nvGrpSpPr>
-            <p:cNvPr id="92" name="Group 91"/>
-            <p:cNvGrpSpPr/>
+        <p:sp>
+          <p:nvSpPr>
+            <p:cNvPr id="93" name="Rectangle 41"/>
+            <p:cNvSpPr>
+              <a:spLocks noChangeArrowheads="1"/>
+            </p:cNvSpPr>
             <p:nvPr/>
-          </p:nvGrpSpPr>
-          <p:grpSpPr>
+          </p:nvSpPr>
+          <p:spPr bwMode="auto">
             <a:xfrm>
               <a:off x="5891213" y="3794125"/>
               <a:ext cx="422275" cy="487363"/>
-              <a:chOff x="4748213" y="3794125"/>
-              <a:chExt cx="422275" cy="487363"/>
             </a:xfrm>
-          </p:grpSpPr>
-          <p:sp>
-            <p:nvSpPr>
-              <p:cNvPr id="93" name="Rectangle 41"/>
-              <p:cNvSpPr>
-                <a:spLocks noChangeArrowheads="1"/>
-              </p:cNvSpPr>
-              <p:nvPr/>
-            </p:nvSpPr>
-            <p:spPr bwMode="auto">
-              <a:xfrm>
-                <a:off x="4748213" y="3794125"/>
-                <a:ext cx="422275" cy="487363"/>
-              </a:xfrm>
-              <a:prstGeom prst="rect">
+            <a:prstGeom prst="rect">
+              <a:avLst/>
+            </a:prstGeom>
+            <a:noFill/>
+            <a:ln>
+              <a:noFill/>
+            </a:ln>
+            <a:extLst>
+              <a:ext uri="{909E8E84-426E-40DD-AFC4-6F175D3DCCD1}">
+                <a14:hiddenFill xmlns:a14="http://schemas.microsoft.com/office/drawing/2010/main">
+                  <a:solidFill>
+                    <a:srgbClr val="FFFFFF"/>
+                  </a:solidFill>
+                </a14:hiddenFill>
+              </a:ext>
+              <a:ext uri="{91240B29-F687-4F45-9708-019B960494DF}">
+                <a14:hiddenLine xmlns:a14="http://schemas.microsoft.com/office/drawing/2010/main" w="9525">
+                  <a:solidFill>
+                    <a:srgbClr val="000000"/>
+                  </a:solidFill>
+                  <a:miter lim="800000"/>
+                  <a:headEnd/>
+                  <a:tailEnd/>
+                </a14:hiddenLine>
+              </a:ext>
+            </a:extLst>
+          </p:spPr>
+          <p:txBody>
+            <a:bodyPr vert="horz" wrap="none" lIns="0" tIns="0" rIns="0" bIns="0" numCol="1" anchor="t" anchorCtr="0" compatLnSpc="1">
+              <a:prstTxWarp prst="textNoShape">
                 <a:avLst/>
-              </a:prstGeom>
-              <a:noFill/>
-              <a:ln>
-                <a:noFill/>
-              </a:ln>
-              <a:extLst>
-                <a:ext uri="{909E8E84-426E-40DD-AFC4-6F175D3DCCD1}">
-                  <a14:hiddenFill xmlns:a14="http://schemas.microsoft.com/office/drawing/2010/main">
-                    <a:solidFill>
-                      <a:srgbClr val="FFFFFF"/>
-                    </a:solidFill>
-                  </a14:hiddenFill>
-                </a:ext>
-                <a:ext uri="{91240B29-F687-4F45-9708-019B960494DF}">
-                  <a14:hiddenLine xmlns:a14="http://schemas.microsoft.com/office/drawing/2010/main" w="9525">
-                    <a:solidFill>
-                      <a:srgbClr val="000000"/>
-                    </a:solidFill>
-                    <a:miter lim="800000"/>
-                    <a:headEnd/>
-                    <a:tailEnd/>
-                  </a14:hiddenLine>
-                </a:ext>
-              </a:extLst>
-            </p:spPr>
-            <p:txBody>
-              <a:bodyPr vert="horz" wrap="none" lIns="0" tIns="0" rIns="0" bIns="0" numCol="1" anchor="t" anchorCtr="0" compatLnSpc="1">
-                <a:prstTxWarp prst="textNoShape">
-                  <a:avLst/>
-                </a:prstTxWarp>
-                <a:spAutoFit/>
-              </a:bodyPr>
-              <a:lstStyle/>
-              <a:p>
-                <a:pPr marL="0" marR="0" lvl="0" indent="0" algn="l" defTabSz="914400" rtl="0" eaLnBrk="1" fontAlgn="base" latinLnBrk="0" hangingPunct="1">
-                  <a:lnSpc>
-                    <a:spcPct val="100000"/>
-                  </a:lnSpc>
-                  <a:spcBef>
-                    <a:spcPct val="0"/>
-                  </a:spcBef>
-                  <a:spcAft>
-                    <a:spcPct val="0"/>
-                  </a:spcAft>
-                  <a:buClrTx/>
-                  <a:buSzTx/>
-                  <a:buFontTx/>
-                  <a:buNone/>
-                  <a:tabLst/>
-                </a:pPr>
-                <a:r>
-                  <a:rPr kumimoji="0" lang="en-US" sz="2500" b="0" i="0" u="none" strike="noStrike" cap="none" normalizeH="0" baseline="0" dirty="0" smtClean="0">
-                    <a:ln>
-                      <a:noFill/>
-                    </a:ln>
-                    <a:solidFill>
-                      <a:srgbClr val="000000"/>
-                    </a:solidFill>
-                    <a:effectLst/>
-                    <a:latin typeface="Symbol" pitchFamily="18" charset="2"/>
-                    <a:cs typeface="Arial" pitchFamily="34" charset="0"/>
-                  </a:rPr>
-                  <a:t>b</a:t>
-                </a:r>
-                <a:endParaRPr kumimoji="0" lang="en-US" sz="1800" b="0" i="0" u="none" strike="noStrike" cap="none" normalizeH="0" baseline="0" dirty="0" smtClean="0">
+              </a:prstTxWarp>
+              <a:spAutoFit/>
+            </a:bodyPr>
+            <a:lstStyle/>
+            <a:p>
+              <a:pPr marL="0" marR="0" lvl="0" indent="0" algn="l" defTabSz="914400" rtl="0" eaLnBrk="1" fontAlgn="base" latinLnBrk="0" hangingPunct="1">
+                <a:lnSpc>
+                  <a:spcPct val="100000"/>
+                </a:lnSpc>
+                <a:spcBef>
+                  <a:spcPct val="0"/>
+                </a:spcBef>
+                <a:spcAft>
+                  <a:spcPct val="0"/>
+                </a:spcAft>
+                <a:buClrTx/>
+                <a:buSzTx/>
+                <a:buFontTx/>
+                <a:buNone/>
+                <a:tabLst/>
+              </a:pPr>
+              <a:r>
+                <a:rPr kumimoji="0" lang="en-US" sz="2500" b="0" i="0" u="none" strike="noStrike" cap="none" normalizeH="0" baseline="0" dirty="0" smtClean="0">
                   <a:ln>
                     <a:noFill/>
                   </a:ln>
                   <a:solidFill>
-                    <a:schemeClr val="tx1"/>
+                    <a:srgbClr val="000000"/>
                   </a:solidFill>
                   <a:effectLst/>
-                  <a:latin typeface="Arial" pitchFamily="34" charset="0"/>
+                  <a:latin typeface="Symbol" pitchFamily="18" charset="2"/>
                   <a:cs typeface="Arial" pitchFamily="34" charset="0"/>
-                </a:endParaRPr>
-              </a:p>
-            </p:txBody>
-          </p:sp>
-          <p:sp>
-            <p:nvSpPr>
-              <p:cNvPr id="94" name="Rectangle 42"/>
-              <p:cNvSpPr>
-                <a:spLocks noChangeArrowheads="1"/>
-              </p:cNvSpPr>
-              <p:nvPr/>
-            </p:nvSpPr>
-            <p:spPr bwMode="auto">
-              <a:xfrm>
-                <a:off x="4926013" y="3976688"/>
-                <a:ext cx="242888" cy="304800"/>
-              </a:xfrm>
-              <a:prstGeom prst="rect">
-                <a:avLst/>
-              </a:prstGeom>
-              <a:noFill/>
-              <a:ln>
-                <a:noFill/>
-              </a:ln>
-              <a:extLst>
-                <a:ext uri="{909E8E84-426E-40DD-AFC4-6F175D3DCCD1}">
-                  <a14:hiddenFill xmlns:a14="http://schemas.microsoft.com/office/drawing/2010/main">
-                    <a:solidFill>
-                      <a:srgbClr val="FFFFFF"/>
-                    </a:solidFill>
-                  </a14:hiddenFill>
-                </a:ext>
-                <a:ext uri="{91240B29-F687-4F45-9708-019B960494DF}">
-                  <a14:hiddenLine xmlns:a14="http://schemas.microsoft.com/office/drawing/2010/main" w="9525">
-                    <a:solidFill>
-                      <a:srgbClr val="000000"/>
-                    </a:solidFill>
-                    <a:miter lim="800000"/>
-                    <a:headEnd/>
-                    <a:tailEnd/>
-                  </a14:hiddenLine>
-                </a:ext>
-              </a:extLst>
-            </p:spPr>
-            <p:txBody>
-              <a:bodyPr vert="horz" wrap="none" lIns="0" tIns="0" rIns="0" bIns="0" numCol="1" anchor="t" anchorCtr="0" compatLnSpc="1">
-                <a:prstTxWarp prst="textNoShape">
-                  <a:avLst/>
-                </a:prstTxWarp>
-                <a:spAutoFit/>
-              </a:bodyPr>
-              <a:lstStyle/>
-              <a:p>
-                <a:pPr marL="0" marR="0" lvl="0" indent="0" algn="l" defTabSz="914400" rtl="0" eaLnBrk="1" fontAlgn="base" latinLnBrk="0" hangingPunct="1">
-                  <a:lnSpc>
-                    <a:spcPct val="100000"/>
-                  </a:lnSpc>
-                  <a:spcBef>
-                    <a:spcPct val="0"/>
-                  </a:spcBef>
-                  <a:spcAft>
-                    <a:spcPct val="0"/>
-                  </a:spcAft>
-                  <a:buClrTx/>
-                  <a:buSzTx/>
-                  <a:buFontTx/>
-                  <a:buNone/>
-                  <a:tabLst/>
-                </a:pPr>
-                <a:r>
-                  <a:rPr kumimoji="0" lang="en-US" sz="1800" b="0" i="0" u="none" strike="noStrike" cap="none" normalizeH="0" baseline="0" smtClean="0">
-                    <a:ln>
-                      <a:noFill/>
-                    </a:ln>
-                    <a:solidFill>
-                      <a:srgbClr val="000000"/>
-                    </a:solidFill>
-                    <a:effectLst/>
-                    <a:latin typeface="Arial" pitchFamily="34" charset="0"/>
-                    <a:cs typeface="Arial" pitchFamily="34" charset="0"/>
-                  </a:rPr>
-                  <a:t>1</a:t>
-                </a:r>
-                <a:endParaRPr kumimoji="0" lang="en-US" sz="1800" b="0" i="0" u="none" strike="noStrike" cap="none" normalizeH="0" baseline="0" smtClean="0">
-                  <a:ln>
-                    <a:noFill/>
-                  </a:ln>
-                  <a:solidFill>
-                    <a:schemeClr val="tx1"/>
-                  </a:solidFill>
-                  <a:effectLst/>
-                  <a:latin typeface="Arial" pitchFamily="34" charset="0"/>
-                  <a:cs typeface="Arial" pitchFamily="34" charset="0"/>
-                </a:endParaRPr>
-              </a:p>
-            </p:txBody>
-          </p:sp>
-        </p:grpSp>
+                </a:rPr>
+                <a:t>b</a:t>
+              </a:r>
+              <a:endParaRPr kumimoji="0" lang="en-US" sz="1800" b="0" i="0" u="none" strike="noStrike" cap="none" normalizeH="0" baseline="0" dirty="0" smtClean="0">
+                <a:ln>
+                  <a:noFill/>
+                </a:ln>
+                <a:solidFill>
+                  <a:schemeClr val="tx1"/>
+                </a:solidFill>
+                <a:effectLst/>
+                <a:latin typeface="Arial" pitchFamily="34" charset="0"/>
+                <a:cs typeface="Arial" pitchFamily="34" charset="0"/>
+              </a:endParaRPr>
+            </a:p>
+          </p:txBody>
+        </p:sp>
         <p:grpSp>
           <p:nvGrpSpPr>
             <p:cNvPr id="95" name="Group 94"/>
@@ -5260,9 +5150,9 @@
           <p:grpSpPr>
             <a:xfrm>
               <a:off x="5891213" y="5011738"/>
-              <a:ext cx="1022350" cy="487363"/>
+              <a:ext cx="890587" cy="487363"/>
               <a:chOff x="4748213" y="5011738"/>
-              <a:chExt cx="1022350" cy="487363"/>
+              <a:chExt cx="890587" cy="487363"/>
             </a:xfrm>
           </p:grpSpPr>
           <p:sp>
@@ -5369,7 +5259,7 @@
             <p:spPr bwMode="auto">
               <a:xfrm>
                 <a:off x="4926013" y="5194300"/>
-                <a:ext cx="242888" cy="304800"/>
+                <a:ext cx="65" cy="276999"/>
               </a:xfrm>
               <a:prstGeom prst="rect">
                 <a:avLst/>
@@ -5423,21 +5313,7 @@
                   <a:buNone/>
                   <a:tabLst/>
                 </a:pPr>
-                <a:r>
-                  <a:rPr kumimoji="0" lang="en-US" sz="1800" b="0" i="0" u="none" strike="noStrike" cap="none" normalizeH="0" baseline="0" smtClean="0">
-                    <a:ln>
-                      <a:noFill/>
-                    </a:ln>
-                    <a:solidFill>
-                      <a:srgbClr val="0000FF"/>
-                    </a:solidFill>
-                    <a:effectLst/>
-                    <a:latin typeface="Arial" pitchFamily="34" charset="0"/>
-                    <a:cs typeface="Arial" pitchFamily="34" charset="0"/>
-                  </a:rPr>
-                  <a:t>1</a:t>
-                </a:r>
-                <a:endParaRPr kumimoji="0" lang="en-US" sz="1800" b="0" i="0" u="none" strike="noStrike" cap="none" normalizeH="0" baseline="0" smtClean="0">
+                <a:endParaRPr kumimoji="0" lang="en-US" sz="1800" b="0" i="0" u="none" strike="noStrike" cap="none" normalizeH="0" baseline="0" dirty="0" smtClean="0">
                   <a:ln>
                     <a:noFill/>
                   </a:ln>
@@ -5461,7 +5337,7 @@
             </p:nvSpPr>
             <p:spPr bwMode="auto">
               <a:xfrm>
-                <a:off x="5121275" y="5011738"/>
+                <a:off x="4989512" y="5011738"/>
                 <a:ext cx="406400" cy="487363"/>
               </a:xfrm>
               <a:prstGeom prst="rect">
@@ -5517,7 +5393,7 @@
                   <a:tabLst/>
                 </a:pPr>
                 <a:r>
-                  <a:rPr kumimoji="0" lang="en-US" sz="2500" b="0" i="0" u="none" strike="noStrike" cap="none" normalizeH="0" baseline="0" smtClean="0">
+                  <a:rPr kumimoji="0" lang="en-US" sz="2500" b="0" i="0" u="none" strike="noStrike" cap="none" normalizeH="0" baseline="0" dirty="0" smtClean="0">
                     <a:ln>
                       <a:noFill/>
                     </a:ln>
@@ -5530,7 +5406,7 @@
                   </a:rPr>
                   <a:t>+</a:t>
                 </a:r>
-                <a:endParaRPr kumimoji="0" lang="en-US" sz="1800" b="0" i="0" u="none" strike="noStrike" cap="none" normalizeH="0" baseline="0" smtClean="0">
+                <a:endParaRPr kumimoji="0" lang="en-US" sz="1800" b="0" i="0" u="none" strike="noStrike" cap="none" normalizeH="0" baseline="0" dirty="0" smtClean="0">
                   <a:ln>
                     <a:noFill/>
                   </a:ln>
@@ -5554,7 +5430,7 @@
             </p:nvSpPr>
             <p:spPr bwMode="auto">
               <a:xfrm>
-                <a:off x="5381625" y="5011738"/>
+                <a:off x="5249862" y="5011738"/>
                 <a:ext cx="357188" cy="487363"/>
               </a:xfrm>
               <a:prstGeom prst="rect">
@@ -5647,7 +5523,7 @@
             </p:nvSpPr>
             <p:spPr bwMode="auto">
               <a:xfrm>
-                <a:off x="5527675" y="5194300"/>
+                <a:off x="5395912" y="5194300"/>
                 <a:ext cx="242888" cy="304800"/>
               </a:xfrm>
               <a:prstGeom prst="rect">
@@ -8033,11 +7909,7 @@
           <a:p>
             <a:r>
               <a:rPr lang="en-US" dirty="0" smtClean="0"/>
-              <a:t>Re-examine </a:t>
-            </a:r>
-            <a:r>
-              <a:rPr lang="en-US" dirty="0" smtClean="0"/>
-              <a:t>Laysan Teal </a:t>
+              <a:t>Re-examine Laysan Teal </a:t>
             </a:r>
             <a:r>
               <a:rPr lang="en-US" dirty="0" err="1"/>
@@ -8084,14 +7956,14 @@
               <a:t> +  </a:t>
             </a:r>
             <a:r>
-              <a:rPr lang="en-US" dirty="0">
+              <a:rPr lang="en-US" dirty="0" smtClean="0">
                 <a:latin typeface="Symbol" pitchFamily="18" charset="2"/>
               </a:rPr>
               <a:t>b</a:t>
             </a:r>
             <a:r>
-              <a:rPr lang="en-US" baseline="-25000" dirty="0"/>
-              <a:t>1 </a:t>
+              <a:rPr lang="en-US" baseline="-25000" dirty="0" smtClean="0"/>
+              <a:t> </a:t>
             </a:r>
             <a:r>
               <a:rPr lang="en-US" dirty="0" err="1" smtClean="0"/>
@@ -8107,11 +7979,7 @@
             <a:pPr lvl="1"/>
             <a:r>
               <a:rPr lang="en-US" dirty="0" smtClean="0"/>
-              <a:t>Non-b</a:t>
-            </a:r>
-            <a:r>
-              <a:rPr lang="en-US" dirty="0" smtClean="0"/>
-              <a:t>reeding: </a:t>
+              <a:t>Non-breeding: </a:t>
             </a:r>
             <a:r>
               <a:rPr lang="en-US" dirty="0" err="1" smtClean="0">
@@ -8162,10 +8030,6 @@
               <a:t>b</a:t>
             </a:r>
             <a:r>
-              <a:rPr lang="en-US" baseline="-25000" dirty="0" smtClean="0"/>
-              <a:t>1</a:t>
-            </a:r>
-            <a:r>
               <a:rPr lang="en-US" dirty="0" smtClean="0"/>
               <a:t>+</a:t>
             </a:r>
@@ -8253,17 +8117,13 @@
               <a:t> + </a:t>
             </a:r>
             <a:r>
-              <a:rPr lang="en-US" sz="2200" dirty="0" smtClean="0">
+              <a:rPr lang="en-US" sz="2200" dirty="0" err="1" smtClean="0">
                 <a:latin typeface="Symbol" pitchFamily="18" charset="2"/>
               </a:rPr>
               <a:t>b</a:t>
             </a:r>
             <a:r>
-              <a:rPr lang="en-US" sz="2200" baseline="-25000" dirty="0" smtClean="0"/>
-              <a:t>1</a:t>
-            </a:r>
-            <a:r>
-              <a:rPr lang="en-US" sz="2200" dirty="0" smtClean="0"/>
+              <a:rPr lang="en-US" sz="2200" dirty="0" err="1" smtClean="0"/>
               <a:t>max.count</a:t>
             </a:r>
             <a:r>
@@ -8336,18 +8196,18 @@
               <a:t> + </a:t>
             </a:r>
             <a:r>
-              <a:rPr lang="en-US" sz="2200" dirty="0" smtClean="0">
+              <a:rPr lang="en-US" sz="2200" dirty="0" err="1" smtClean="0">
                 <a:latin typeface="Symbol" pitchFamily="18" charset="2"/>
               </a:rPr>
               <a:t>b</a:t>
             </a:r>
             <a:r>
-              <a:rPr lang="en-US" sz="2200" baseline="-25000" dirty="0" smtClean="0"/>
-              <a:t>1</a:t>
-            </a:r>
-            <a:r>
-              <a:rPr lang="en-US" sz="2200" dirty="0"/>
-              <a:t>max.count </a:t>
+              <a:rPr lang="en-US" sz="2200" dirty="0" err="1" smtClean="0"/>
+              <a:t>max.count</a:t>
+            </a:r>
+            <a:r>
+              <a:rPr lang="en-US" sz="2200" dirty="0" smtClean="0"/>
+              <a:t> </a:t>
             </a:r>
             <a:r>
               <a:rPr lang="en-US" sz="2200" dirty="0"/>
@@ -8365,11 +8225,7 @@
             </a:r>
             <a:r>
               <a:rPr lang="en-US" sz="2200" dirty="0" smtClean="0"/>
-              <a:t>NB</a:t>
-            </a:r>
-            <a:r>
-              <a:rPr lang="en-US" sz="2200" dirty="0" smtClean="0"/>
-              <a:t> </a:t>
+              <a:t>NB </a:t>
             </a:r>
             <a:r>
               <a:rPr lang="en-US" sz="2200" dirty="0"/>
@@ -9260,8 +9116,8 @@
         </p:nvSpPr>
         <p:spPr bwMode="auto">
           <a:xfrm>
-            <a:off x="457200" y="990600"/>
-            <a:ext cx="8382000" cy="1143000"/>
+            <a:off x="219075" y="990600"/>
+            <a:ext cx="8858250" cy="1143000"/>
           </a:xfrm>
           <a:prstGeom prst="rect">
             <a:avLst/>
@@ -9444,11 +9300,15 @@
             </a:r>
             <a:r>
               <a:rPr lang="en-US" sz="2400" b="0" baseline="-25000" dirty="0" err="1" smtClean="0"/>
-              <a:t>fert.succ</a:t>
+              <a:t>mr.estimate</a:t>
             </a:r>
             <a:r>
               <a:rPr lang="en-US" sz="2400" b="0" dirty="0" smtClean="0"/>
-              <a:t> = </a:t>
+              <a:t> </a:t>
+            </a:r>
+            <a:r>
+              <a:rPr lang="en-US" sz="2400" b="0" dirty="0" smtClean="0"/>
+              <a:t>= </a:t>
             </a:r>
             <a:r>
               <a:rPr lang="en-US" sz="2400" b="0" dirty="0" smtClean="0">
@@ -9461,18 +9321,22 @@
               <a:t> + </a:t>
             </a:r>
             <a:r>
-              <a:rPr lang="en-US" sz="2400" b="0" dirty="0" smtClean="0">
+              <a:rPr lang="en-US" sz="2400" b="0" dirty="0" err="1" smtClean="0">
                 <a:latin typeface="Symbol" pitchFamily="18" charset="2"/>
               </a:rPr>
               <a:t>b</a:t>
             </a:r>
             <a:r>
-              <a:rPr lang="en-US" sz="2400" b="0" baseline="-25000" dirty="0" smtClean="0"/>
-              <a:t>1</a:t>
+              <a:rPr lang="en-US" sz="2400" b="0" dirty="0" err="1"/>
+              <a:t>max.count</a:t>
             </a:r>
             <a:r>
               <a:rPr lang="en-US" sz="2400" b="0" dirty="0" smtClean="0"/>
-              <a:t>step.len + </a:t>
+              <a:t> </a:t>
+            </a:r>
+            <a:r>
+              <a:rPr lang="en-US" sz="2400" b="0" dirty="0" smtClean="0"/>
+              <a:t>+ </a:t>
             </a:r>
             <a:r>
               <a:rPr lang="en-US" sz="2400" b="0" dirty="0" smtClean="0">
@@ -9485,9 +9349,10 @@
               <a:t>1</a:t>
             </a:r>
             <a:r>
-              <a:rPr lang="en-US" sz="2400" b="0" dirty="0" smtClean="0"/>
-              <a:t>parr</a:t>
-            </a:r>
+              <a:rPr lang="en-US" sz="2400" b="0" dirty="0"/>
+              <a:t>NB</a:t>
+            </a:r>
+            <a:endParaRPr lang="en-US" sz="2400" b="0" dirty="0" smtClean="0"/>
           </a:p>
           <a:p>
             <a:pPr marL="457200" lvl="1" indent="0">
@@ -9512,12 +9377,16 @@
               <a:t>m</a:t>
             </a:r>
             <a:r>
-              <a:rPr lang="en-US" sz="2400" b="0" baseline="-25000" dirty="0" err="1" smtClean="0"/>
-              <a:t>fert.succ</a:t>
+              <a:rPr lang="en-US" sz="2400" b="0" baseline="-25000" dirty="0" err="1"/>
+              <a:t>mr.estimate</a:t>
             </a:r>
             <a:r>
               <a:rPr lang="en-US" sz="2400" b="0" dirty="0" smtClean="0"/>
-              <a:t> = </a:t>
+              <a:t> </a:t>
+            </a:r>
+            <a:r>
+              <a:rPr lang="en-US" sz="2400" b="0" dirty="0" smtClean="0"/>
+              <a:t>= </a:t>
             </a:r>
             <a:r>
               <a:rPr lang="en-US" sz="2400" b="0" dirty="0" smtClean="0">
@@ -9530,18 +9399,22 @@
               <a:t> + </a:t>
             </a:r>
             <a:r>
-              <a:rPr lang="en-US" sz="2400" b="0" dirty="0" smtClean="0">
+              <a:rPr lang="en-US" sz="2400" b="0" dirty="0" err="1" smtClean="0">
                 <a:latin typeface="Symbol" pitchFamily="18" charset="2"/>
               </a:rPr>
               <a:t>b</a:t>
             </a:r>
             <a:r>
-              <a:rPr lang="en-US" sz="2400" b="0" baseline="-25000" dirty="0" smtClean="0"/>
-              <a:t>1</a:t>
+              <a:rPr lang="en-US" sz="2400" b="0" dirty="0" err="1"/>
+              <a:t>max.count</a:t>
+            </a:r>
+            <a:r>
+              <a:rPr lang="en-US" sz="2400" b="0" dirty="0"/>
+              <a:t> </a:t>
             </a:r>
             <a:r>
               <a:rPr lang="en-US" sz="2400" b="0" dirty="0" smtClean="0"/>
-              <a:t>step.len + </a:t>
+              <a:t>+ </a:t>
             </a:r>
             <a:r>
               <a:rPr lang="en-US" sz="2400" b="0" dirty="0" smtClean="0">
@@ -9554,8 +9427,12 @@
               <a:t>1</a:t>
             </a:r>
             <a:r>
+              <a:rPr lang="en-US" sz="2400" b="0" dirty="0"/>
+              <a:t>NB </a:t>
+            </a:r>
+            <a:r>
               <a:rPr lang="en-US" sz="2400" b="0" dirty="0" smtClean="0"/>
-              <a:t>parr + </a:t>
+              <a:t>+ </a:t>
             </a:r>
             <a:r>
               <a:rPr lang="en-US" sz="2400" b="0" dirty="0" smtClean="0">
@@ -9568,20 +9445,18 @@
               <a:t>1</a:t>
             </a:r>
             <a:r>
+              <a:rPr lang="en-US" sz="2400" b="0" dirty="0"/>
+              <a:t>NB</a:t>
+            </a:r>
+            <a:r>
               <a:rPr lang="en-US" sz="2400" b="0" dirty="0" smtClean="0"/>
-              <a:t>parr*</a:t>
+              <a:t>*</a:t>
             </a:r>
             <a:r>
               <a:rPr lang="en-US" sz="2400" b="0" dirty="0" err="1" smtClean="0"/>
-              <a:t>step.len</a:t>
+              <a:t>max.count</a:t>
             </a:r>
             <a:endParaRPr lang="en-US" sz="2400" b="0" dirty="0" smtClean="0"/>
-          </a:p>
-          <a:p>
-            <a:pPr marL="0" indent="0">
-              <a:buNone/>
-            </a:pPr>
-            <a:endParaRPr lang="en-US" sz="2400" b="0" dirty="0"/>
           </a:p>
         </p:txBody>
       </p:sp>
@@ -9789,11 +9664,7 @@
             <a:pPr lvl="1"/>
             <a:r>
               <a:rPr lang="en-US" sz="2400" dirty="0" smtClean="0"/>
-              <a:t>Breeding</a:t>
-            </a:r>
-            <a:r>
-              <a:rPr lang="en-US" sz="2400" dirty="0" smtClean="0"/>
-              <a:t>:</a:t>
+              <a:t>Breeding:</a:t>
             </a:r>
             <a:r>
               <a:rPr lang="en-US" sz="2400" dirty="0"/>
@@ -9828,21 +9699,17 @@
               <a:t> + </a:t>
             </a:r>
             <a:r>
-              <a:rPr lang="en-US" sz="2400" dirty="0">
+              <a:rPr lang="en-US" sz="2400" dirty="0" err="1" smtClean="0">
                 <a:latin typeface="Symbol" pitchFamily="18" charset="2"/>
               </a:rPr>
               <a:t>b</a:t>
             </a:r>
             <a:r>
-              <a:rPr lang="en-US" sz="2400" baseline="-25000" dirty="0"/>
-              <a:t>1 </a:t>
-            </a:r>
-            <a:r>
-              <a:rPr lang="en-US" sz="2400" dirty="0" err="1"/>
+              <a:rPr lang="en-US" sz="2400" dirty="0" err="1" smtClean="0"/>
               <a:t>max.count</a:t>
             </a:r>
             <a:r>
-              <a:rPr lang="en-US" sz="2400" dirty="0"/>
+              <a:rPr lang="en-US" sz="2400" dirty="0" smtClean="0"/>
               <a:t> </a:t>
             </a:r>
             <a:endParaRPr lang="en-US" sz="2400" dirty="0"/>
@@ -9851,11 +9718,7 @@
             <a:pPr lvl="1"/>
             <a:r>
               <a:rPr lang="en-US" sz="2400" dirty="0" smtClean="0"/>
-              <a:t>Non-breeding</a:t>
-            </a:r>
-            <a:r>
-              <a:rPr lang="en-US" sz="2400" dirty="0" smtClean="0"/>
-              <a:t>:  </a:t>
+              <a:t>Non-breeding:  </a:t>
             </a:r>
             <a:r>
               <a:rPr lang="en-US" sz="2400" dirty="0" err="1" smtClean="0">
@@ -9900,17 +9763,13 @@
               <a:t>) + </a:t>
             </a:r>
             <a:r>
-              <a:rPr lang="en-US" sz="2400" dirty="0">
+              <a:rPr lang="en-US" sz="2400" dirty="0" err="1" smtClean="0">
                 <a:latin typeface="Symbol" pitchFamily="18" charset="2"/>
               </a:rPr>
               <a:t>b</a:t>
             </a:r>
             <a:r>
-              <a:rPr lang="en-US" sz="2400" baseline="-25000" dirty="0"/>
-              <a:t>1 </a:t>
-            </a:r>
-            <a:r>
-              <a:rPr lang="en-US" sz="2400" dirty="0" err="1"/>
+              <a:rPr lang="en-US" sz="2400" dirty="0" err="1" smtClean="0"/>
               <a:t>max.count</a:t>
             </a:r>
             <a:endParaRPr lang="en-US" sz="2400" dirty="0"/>
@@ -9982,17 +9841,13 @@
               <a:t> + </a:t>
             </a:r>
             <a:r>
-              <a:rPr lang="en-US" dirty="0" smtClean="0">
+              <a:rPr lang="en-US" dirty="0" err="1" smtClean="0">
                 <a:latin typeface="Symbol" pitchFamily="18" charset="2"/>
               </a:rPr>
               <a:t>b</a:t>
             </a:r>
             <a:r>
-              <a:rPr lang="en-US" baseline="-25000" dirty="0" smtClean="0"/>
-              <a:t>1</a:t>
-            </a:r>
-            <a:r>
-              <a:rPr lang="en-US" dirty="0"/>
+              <a:rPr lang="en-US" dirty="0" err="1" smtClean="0"/>
               <a:t>max.count</a:t>
             </a:r>
             <a:endParaRPr lang="en-US" dirty="0"/>
@@ -10043,17 +9898,13 @@
               <a:t> + </a:t>
             </a:r>
             <a:r>
-              <a:rPr lang="en-US" dirty="0" smtClean="0">
+              <a:rPr lang="en-US" dirty="0" err="1" smtClean="0">
                 <a:latin typeface="Symbol" pitchFamily="18" charset="2"/>
               </a:rPr>
               <a:t>b</a:t>
             </a:r>
             <a:r>
-              <a:rPr lang="en-US" baseline="-25000" dirty="0" smtClean="0"/>
-              <a:t>1</a:t>
-            </a:r>
-            <a:r>
-              <a:rPr lang="en-US" dirty="0"/>
+              <a:rPr lang="en-US" dirty="0" err="1" smtClean="0"/>
               <a:t>max.count</a:t>
             </a:r>
             <a:r>
@@ -11089,11 +10940,19 @@
             <a:pPr lvl="1"/>
             <a:r>
               <a:rPr lang="en-US" dirty="0"/>
-              <a:t>bay </a:t>
+              <a:t>B</a:t>
             </a:r>
             <a:r>
               <a:rPr lang="en-US" dirty="0" smtClean="0"/>
-              <a:t>anchovy </a:t>
+              <a:t>ay </a:t>
+            </a:r>
+            <a:r>
+              <a:rPr lang="en-US" dirty="0"/>
+              <a:t>A</a:t>
+            </a:r>
+            <a:r>
+              <a:rPr lang="en-US" dirty="0" smtClean="0"/>
+              <a:t>nchovy </a:t>
             </a:r>
             <a:r>
               <a:rPr lang="en-US" dirty="0"/>
@@ -11120,7 +10979,15 @@
             <a:pPr lvl="1"/>
             <a:r>
               <a:rPr lang="en-US" dirty="0"/>
-              <a:t>bluefish (</a:t>
+              <a:t>B</a:t>
+            </a:r>
+            <a:r>
+              <a:rPr lang="en-US" dirty="0" smtClean="0"/>
+              <a:t>luefish </a:t>
+            </a:r>
+            <a:r>
+              <a:rPr lang="en-US" dirty="0"/>
+              <a:t>(</a:t>
             </a:r>
             <a:r>
               <a:rPr lang="en-US" i="1" dirty="0" err="1"/>
@@ -11143,7 +11010,23 @@
             <a:pPr lvl="1"/>
             <a:r>
               <a:rPr lang="en-US" dirty="0"/>
-              <a:t>striped bass (</a:t>
+              <a:t>S</a:t>
+            </a:r>
+            <a:r>
+              <a:rPr lang="en-US" dirty="0" smtClean="0"/>
+              <a:t>triped </a:t>
+            </a:r>
+            <a:r>
+              <a:rPr lang="en-US" dirty="0"/>
+              <a:t>B</a:t>
+            </a:r>
+            <a:r>
+              <a:rPr lang="en-US" dirty="0" smtClean="0"/>
+              <a:t>ass </a:t>
+            </a:r>
+            <a:r>
+              <a:rPr lang="en-US" dirty="0"/>
+              <a:t>(</a:t>
             </a:r>
             <a:r>
               <a:rPr lang="en-US" i="1" dirty="0" err="1"/>
@@ -11166,7 +11049,15 @@
             <a:pPr lvl="1"/>
             <a:r>
               <a:rPr lang="en-US" dirty="0"/>
-              <a:t>weakfish (</a:t>
+              <a:t>W</a:t>
+            </a:r>
+            <a:r>
+              <a:rPr lang="en-US" dirty="0" smtClean="0"/>
+              <a:t>eakfish </a:t>
+            </a:r>
+            <a:r>
+              <a:rPr lang="en-US" dirty="0"/>
+              <a:t>(</a:t>
             </a:r>
             <a:r>
               <a:rPr lang="en-US" i="1" dirty="0" err="1"/>
@@ -13617,11 +13508,7 @@
             </a:r>
             <a:r>
               <a:rPr lang="en-US" dirty="0" smtClean="0"/>
-              <a:t> </a:t>
-            </a:r>
-            <a:r>
-              <a:rPr lang="en-US" dirty="0" smtClean="0"/>
-              <a:t>on Page 5</a:t>
+              <a:t> on Page 5</a:t>
             </a:r>
             <a:endParaRPr lang="en-US" dirty="0"/>
           </a:p>
@@ -13806,6 +13693,13 @@
   <p:clrMapOvr>
     <a:masterClrMapping/>
   </p:clrMapOvr>
+  <p:timing>
+    <p:tnLst>
+      <p:par>
+        <p:cTn id="1" dur="indefinite" restart="never" nodeType="tmRoot"/>
+      </p:par>
+    </p:tnLst>
+  </p:timing>
 </p:sld>
 </file>
 
@@ -17029,6 +16923,13 @@
   <p:clrMapOvr>
     <a:masterClrMapping/>
   </p:clrMapOvr>
+  <p:timing>
+    <p:tnLst>
+      <p:par>
+        <p:cTn id="1" dur="indefinite" restart="never" nodeType="tmRoot"/>
+      </p:par>
+    </p:tnLst>
+  </p:timing>
 </p:sld>
 </file>
 
@@ -19994,15 +19895,7 @@
                   <a:schemeClr val="accent2"/>
                 </a:solidFill>
               </a:rPr>
-              <a:t>NB</a:t>
-            </a:r>
-            <a:r>
-              <a:rPr lang="en-US" b="1" dirty="0" smtClean="0">
-                <a:solidFill>
-                  <a:schemeClr val="accent2"/>
-                </a:solidFill>
-              </a:rPr>
-              <a:t> </a:t>
+              <a:t>NB </a:t>
             </a:r>
             <a:r>
               <a:rPr lang="en-US" b="1" dirty="0">
@@ -20509,11 +20402,7 @@
             </a:pPr>
             <a:r>
               <a:rPr lang="en-US" dirty="0" smtClean="0"/>
-              <a:t>Three </a:t>
-            </a:r>
-            <a:r>
-              <a:rPr lang="en-US" dirty="0" smtClean="0"/>
-              <a:t>locations – California, Hawaii, and Texas</a:t>
+              <a:t>Three locations – California, Hawaii, and Texas</a:t>
             </a:r>
             <a:endParaRPr lang="en-US" dirty="0"/>
           </a:p>
@@ -21763,11 +21652,7 @@
             </a:pPr>
             <a:r>
               <a:rPr lang="en-US" sz="2800" dirty="0" smtClean="0"/>
-              <a:t>For </a:t>
-            </a:r>
-            <a:r>
-              <a:rPr lang="en-US" sz="2800" dirty="0" smtClean="0"/>
-              <a:t>Laysan Teal…</a:t>
+              <a:t>For Laysan Teal…</a:t>
             </a:r>
             <a:endParaRPr lang="en-US" sz="2800" dirty="0"/>
           </a:p>
@@ -21810,17 +21695,13 @@
               <a:t> + </a:t>
             </a:r>
             <a:r>
-              <a:rPr lang="en-US" sz="2200" dirty="0" smtClean="0">
+              <a:rPr lang="en-US" sz="2200" dirty="0" err="1" smtClean="0">
                 <a:latin typeface="Symbol" pitchFamily="18" charset="2"/>
               </a:rPr>
               <a:t>b</a:t>
             </a:r>
             <a:r>
-              <a:rPr lang="en-US" sz="2200" baseline="-25000" dirty="0" smtClean="0"/>
-              <a:t>1</a:t>
-            </a:r>
-            <a:r>
-              <a:rPr lang="en-US" sz="2200" dirty="0" smtClean="0"/>
+              <a:rPr lang="en-US" sz="2200" dirty="0" err="1" smtClean="0"/>
               <a:t>max.count</a:t>
             </a:r>
             <a:r>
@@ -21843,11 +21724,7 @@
             </a:r>
             <a:r>
               <a:rPr lang="en-US" sz="2200" dirty="0" smtClean="0"/>
-              <a:t>NB</a:t>
-            </a:r>
-            <a:r>
-              <a:rPr lang="en-US" sz="2200" dirty="0" smtClean="0"/>
-              <a:t> </a:t>
+              <a:t>NB </a:t>
             </a:r>
             <a:r>
               <a:rPr lang="en-US" sz="2200" dirty="0"/>
@@ -21865,11 +21742,7 @@
             </a:r>
             <a:r>
               <a:rPr lang="en-US" sz="2200" dirty="0" smtClean="0"/>
-              <a:t>NB</a:t>
-            </a:r>
-            <a:r>
-              <a:rPr lang="en-US" sz="2200" dirty="0" smtClean="0"/>
-              <a:t>*</a:t>
+              <a:t>NB*</a:t>
             </a:r>
             <a:r>
               <a:rPr lang="en-US" sz="2200" dirty="0" err="1" smtClean="0"/>
@@ -21925,14 +21798,12 @@
               <a:t>b</a:t>
             </a:r>
             <a:r>
-              <a:rPr lang="en-US" sz="2400" baseline="-25000" dirty="0" smtClean="0">
-                <a:latin typeface="Symbol" pitchFamily="18" charset="2"/>
-              </a:rPr>
-              <a:t>1</a:t>
-            </a:r>
-            <a:r>
               <a:rPr lang="en-US" sz="2400" dirty="0" smtClean="0"/>
-              <a:t> is on the covariate</a:t>
+              <a:t> </a:t>
+            </a:r>
+            <a:r>
+              <a:rPr lang="en-US" sz="2400" dirty="0" smtClean="0"/>
+              <a:t>is on the covariate</a:t>
             </a:r>
             <a:endParaRPr lang="en-US" sz="2400" dirty="0"/>
           </a:p>
@@ -22492,15 +22363,7 @@
             </a:pPr>
             <a:r>
               <a:rPr lang="en-US" sz="2800" dirty="0" smtClean="0"/>
-              <a:t>Recall </a:t>
-            </a:r>
-            <a:r>
-              <a:rPr lang="en-US" sz="2800" dirty="0" smtClean="0"/>
-              <a:t>Laysan Teal ultimate </a:t>
-            </a:r>
-            <a:r>
-              <a:rPr lang="en-US" sz="2800" dirty="0" smtClean="0"/>
-              <a:t>full model …</a:t>
+              <a:t>Recall Laysan Teal ultimate full model …</a:t>
             </a:r>
           </a:p>
           <a:p>
@@ -22525,11 +22388,7 @@
             </a:r>
             <a:r>
               <a:rPr lang="en-US" sz="2200" dirty="0" smtClean="0"/>
-              <a:t> </a:t>
-            </a:r>
-            <a:r>
-              <a:rPr lang="en-US" sz="2200" dirty="0" smtClean="0"/>
-              <a:t>= </a:t>
+              <a:t> = </a:t>
             </a:r>
             <a:r>
               <a:rPr lang="en-US" sz="2200" dirty="0" smtClean="0">
@@ -22542,17 +22401,13 @@
               <a:t> + </a:t>
             </a:r>
             <a:r>
-              <a:rPr lang="en-US" sz="2200" dirty="0" smtClean="0">
+              <a:rPr lang="en-US" sz="2200" dirty="0" err="1" smtClean="0">
                 <a:latin typeface="Symbol" pitchFamily="18" charset="2"/>
               </a:rPr>
               <a:t>b</a:t>
             </a:r>
             <a:r>
-              <a:rPr lang="en-US" sz="2200" baseline="-25000" dirty="0" smtClean="0"/>
-              <a:t>1</a:t>
-            </a:r>
-            <a:r>
-              <a:rPr lang="en-US" sz="2200" dirty="0" smtClean="0"/>
+              <a:rPr lang="en-US" sz="2200" dirty="0" err="1" smtClean="0"/>
               <a:t>max.count</a:t>
             </a:r>
             <a:r>
@@ -22575,15 +22430,7 @@
             </a:r>
             <a:r>
               <a:rPr lang="en-US" sz="2200" dirty="0" smtClean="0"/>
-              <a:t>NB</a:t>
-            </a:r>
-            <a:r>
-              <a:rPr lang="en-US" sz="2200" dirty="0" smtClean="0"/>
-              <a:t> </a:t>
-            </a:r>
-            <a:r>
-              <a:rPr lang="en-US" sz="2200" dirty="0" smtClean="0"/>
-              <a:t>+ </a:t>
+              <a:t>NB + </a:t>
             </a:r>
             <a:r>
               <a:rPr lang="en-US" sz="2200" dirty="0" smtClean="0">
@@ -22597,11 +22444,7 @@
             </a:r>
             <a:r>
               <a:rPr lang="en-US" sz="2200" dirty="0" smtClean="0"/>
-              <a:t>NB</a:t>
-            </a:r>
-            <a:r>
-              <a:rPr lang="en-US" sz="2200" dirty="0" smtClean="0"/>
-              <a:t>*</a:t>
+              <a:t>NB*</a:t>
             </a:r>
             <a:r>
               <a:rPr lang="en-US" sz="2200" dirty="0" err="1" smtClean="0"/>
@@ -22995,89 +22838,81 @@
               <a:t> + </a:t>
             </a:r>
             <a:r>
+              <a:rPr lang="en-US" sz="2800" dirty="0" err="1" smtClean="0">
+                <a:latin typeface="Symbol" pitchFamily="18" charset="2"/>
+              </a:rPr>
+              <a:t>b</a:t>
+            </a:r>
+            <a:r>
+              <a:rPr lang="en-US" sz="2800" dirty="0" err="1" smtClean="0"/>
+              <a:t>max.count</a:t>
+            </a:r>
+            <a:r>
+              <a:rPr lang="en-US" sz="2800" dirty="0" smtClean="0"/>
+              <a:t> </a:t>
+            </a:r>
+            <a:endParaRPr lang="en-US" sz="2800" dirty="0"/>
+          </a:p>
+          <a:p>
+            <a:r>
+              <a:rPr lang="en-US" sz="2800" b="1" dirty="0" err="1"/>
+              <a:t>parr</a:t>
+            </a:r>
+            <a:r>
+              <a:rPr lang="en-US" sz="2800" b="1" dirty="0"/>
+              <a:t>:   </a:t>
+            </a:r>
+            <a:r>
+              <a:rPr lang="en-US" sz="2800" b="1" dirty="0" smtClean="0"/>
+              <a:t>   </a:t>
+            </a:r>
+            <a:r>
+              <a:rPr lang="en-US" sz="2800" dirty="0" err="1" smtClean="0">
+                <a:latin typeface="Symbol" pitchFamily="18" charset="2"/>
+              </a:rPr>
+              <a:t>m</a:t>
+            </a:r>
+            <a:r>
+              <a:rPr lang="en-US" sz="2800" baseline="-25000" dirty="0" err="1"/>
+              <a:t>mr.estimate</a:t>
+            </a:r>
+            <a:r>
+              <a:rPr lang="en-US" sz="2800" dirty="0" smtClean="0"/>
+              <a:t> </a:t>
+            </a:r>
+            <a:r>
+              <a:rPr lang="en-US" sz="2800" dirty="0"/>
+              <a:t>= (</a:t>
+            </a:r>
+            <a:r>
+              <a:rPr lang="en-US" sz="2800" dirty="0">
+                <a:latin typeface="Symbol" pitchFamily="18" charset="2"/>
+              </a:rPr>
+              <a:t>a</a:t>
+            </a:r>
+            <a:r>
+              <a:rPr lang="en-US" sz="2800" dirty="0"/>
+              <a:t>+</a:t>
+            </a:r>
+            <a:r>
+              <a:rPr lang="en-US" sz="2800" dirty="0">
+                <a:latin typeface="Symbol" pitchFamily="18" charset="2"/>
+              </a:rPr>
+              <a:t>d</a:t>
+            </a:r>
+            <a:r>
+              <a:rPr lang="en-US" sz="2800" baseline="-25000" dirty="0"/>
+              <a:t>1</a:t>
+            </a:r>
+            <a:r>
+              <a:rPr lang="en-US" sz="2800" dirty="0"/>
+              <a:t>) + (</a:t>
+            </a:r>
+            <a:r>
               <a:rPr lang="en-US" sz="2800" dirty="0" smtClean="0">
                 <a:latin typeface="Symbol" pitchFamily="18" charset="2"/>
               </a:rPr>
               <a:t>b</a:t>
-            </a:r>
-            <a:r>
-              <a:rPr lang="en-US" sz="2800" baseline="-25000" dirty="0" smtClean="0"/>
-              <a:t>1</a:t>
-            </a:r>
-            <a:r>
-              <a:rPr lang="en-US" sz="2800" dirty="0" smtClean="0"/>
-              <a:t>max.count</a:t>
-            </a:r>
-            <a:r>
-              <a:rPr lang="en-US" sz="2800" dirty="0" smtClean="0"/>
-              <a:t> </a:t>
-            </a:r>
-            <a:endParaRPr lang="en-US" sz="2800" dirty="0"/>
-          </a:p>
-          <a:p>
-            <a:r>
-              <a:rPr lang="en-US" sz="2800" b="1" dirty="0" err="1"/>
-              <a:t>parr</a:t>
-            </a:r>
-            <a:r>
-              <a:rPr lang="en-US" sz="2800" b="1" dirty="0"/>
-              <a:t>:   </a:t>
-            </a:r>
-            <a:r>
-              <a:rPr lang="en-US" sz="2800" b="1" dirty="0" smtClean="0"/>
-              <a:t>   </a:t>
-            </a:r>
-            <a:r>
-              <a:rPr lang="en-US" sz="2800" dirty="0" err="1" smtClean="0">
-                <a:latin typeface="Symbol" pitchFamily="18" charset="2"/>
-              </a:rPr>
-              <a:t>m</a:t>
-            </a:r>
-            <a:r>
-              <a:rPr lang="en-US" sz="2800" baseline="-25000" dirty="0" err="1"/>
-              <a:t>mr.estimate</a:t>
-            </a:r>
-            <a:r>
-              <a:rPr lang="en-US" sz="2800" dirty="0" smtClean="0"/>
-              <a:t> </a:t>
-            </a:r>
-            <a:r>
-              <a:rPr lang="en-US" sz="2800" dirty="0"/>
-              <a:t>= (</a:t>
-            </a:r>
-            <a:r>
-              <a:rPr lang="en-US" sz="2800" dirty="0">
-                <a:latin typeface="Symbol" pitchFamily="18" charset="2"/>
-              </a:rPr>
-              <a:t>a</a:t>
-            </a:r>
-            <a:r>
-              <a:rPr lang="en-US" sz="2800" dirty="0"/>
-              <a:t>+</a:t>
-            </a:r>
-            <a:r>
-              <a:rPr lang="en-US" sz="2800" dirty="0">
-                <a:latin typeface="Symbol" pitchFamily="18" charset="2"/>
-              </a:rPr>
-              <a:t>d</a:t>
-            </a:r>
-            <a:r>
-              <a:rPr lang="en-US" sz="2800" baseline="-25000" dirty="0"/>
-              <a:t>1</a:t>
-            </a:r>
-            <a:r>
-              <a:rPr lang="en-US" sz="2800" dirty="0"/>
-              <a:t>) + (</a:t>
-            </a:r>
-            <a:r>
-              <a:rPr lang="en-US" sz="2800" dirty="0" smtClean="0">
-                <a:latin typeface="Symbol" pitchFamily="18" charset="2"/>
-              </a:rPr>
-              <a:t>b</a:t>
-            </a:r>
-            <a:r>
-              <a:rPr lang="en-US" sz="2800" baseline="-25000" dirty="0" smtClean="0"/>
-              <a:t>1</a:t>
             </a:r>
             <a:r>
               <a:rPr lang="en-US" sz="2800" dirty="0" smtClean="0"/>
@@ -23845,207 +23680,99 @@
           </p:txBody>
         </p:sp>
       </p:grpSp>
-      <p:grpSp>
-        <p:nvGrpSpPr>
-          <p:cNvPr id="310326" name="Group 310325"/>
-          <p:cNvGrpSpPr/>
+      <p:sp>
+        <p:nvSpPr>
+          <p:cNvPr id="310285" name="Rectangle 41"/>
+          <p:cNvSpPr>
+            <a:spLocks noChangeArrowheads="1"/>
+          </p:cNvSpPr>
           <p:nvPr/>
-        </p:nvGrpSpPr>
-        <p:grpSpPr>
+        </p:nvSpPr>
+        <p:spPr bwMode="auto">
           <a:xfrm>
             <a:off x="5891213" y="3794125"/>
             <a:ext cx="422275" cy="487363"/>
-            <a:chOff x="4748213" y="3794125"/>
-            <a:chExt cx="422275" cy="487363"/>
           </a:xfrm>
-        </p:grpSpPr>
-        <p:sp>
-          <p:nvSpPr>
-            <p:cNvPr id="310285" name="Rectangle 41"/>
-            <p:cNvSpPr>
-              <a:spLocks noChangeArrowheads="1"/>
-            </p:cNvSpPr>
-            <p:nvPr/>
-          </p:nvSpPr>
-          <p:spPr bwMode="auto">
-            <a:xfrm>
-              <a:off x="4748213" y="3794125"/>
-              <a:ext cx="422275" cy="487363"/>
-            </a:xfrm>
-            <a:prstGeom prst="rect">
+          <a:prstGeom prst="rect">
+            <a:avLst/>
+          </a:prstGeom>
+          <a:noFill/>
+          <a:ln>
+            <a:noFill/>
+          </a:ln>
+          <a:extLst>
+            <a:ext uri="{909E8E84-426E-40DD-AFC4-6F175D3DCCD1}">
+              <a14:hiddenFill xmlns:a14="http://schemas.microsoft.com/office/drawing/2010/main">
+                <a:solidFill>
+                  <a:srgbClr val="FFFFFF"/>
+                </a:solidFill>
+              </a14:hiddenFill>
+            </a:ext>
+            <a:ext uri="{91240B29-F687-4F45-9708-019B960494DF}">
+              <a14:hiddenLine xmlns:a14="http://schemas.microsoft.com/office/drawing/2010/main" w="9525">
+                <a:solidFill>
+                  <a:srgbClr val="000000"/>
+                </a:solidFill>
+                <a:miter lim="800000"/>
+                <a:headEnd/>
+                <a:tailEnd/>
+              </a14:hiddenLine>
+            </a:ext>
+          </a:extLst>
+        </p:spPr>
+        <p:txBody>
+          <a:bodyPr vert="horz" wrap="none" lIns="0" tIns="0" rIns="0" bIns="0" numCol="1" anchor="t" anchorCtr="0" compatLnSpc="1">
+            <a:prstTxWarp prst="textNoShape">
               <a:avLst/>
-            </a:prstGeom>
-            <a:noFill/>
-            <a:ln>
-              <a:noFill/>
-            </a:ln>
-            <a:extLst>
-              <a:ext uri="{909E8E84-426E-40DD-AFC4-6F175D3DCCD1}">
-                <a14:hiddenFill xmlns:a14="http://schemas.microsoft.com/office/drawing/2010/main">
-                  <a:solidFill>
-                    <a:srgbClr val="FFFFFF"/>
-                  </a:solidFill>
-                </a14:hiddenFill>
-              </a:ext>
-              <a:ext uri="{91240B29-F687-4F45-9708-019B960494DF}">
-                <a14:hiddenLine xmlns:a14="http://schemas.microsoft.com/office/drawing/2010/main" w="9525">
-                  <a:solidFill>
-                    <a:srgbClr val="000000"/>
-                  </a:solidFill>
-                  <a:miter lim="800000"/>
-                  <a:headEnd/>
-                  <a:tailEnd/>
-                </a14:hiddenLine>
-              </a:ext>
-            </a:extLst>
-          </p:spPr>
-          <p:txBody>
-            <a:bodyPr vert="horz" wrap="none" lIns="0" tIns="0" rIns="0" bIns="0" numCol="1" anchor="t" anchorCtr="0" compatLnSpc="1">
-              <a:prstTxWarp prst="textNoShape">
-                <a:avLst/>
-              </a:prstTxWarp>
-              <a:spAutoFit/>
-            </a:bodyPr>
-            <a:lstStyle/>
-            <a:p>
-              <a:pPr marL="0" marR="0" lvl="0" indent="0" algn="l" defTabSz="914400" rtl="0" eaLnBrk="1" fontAlgn="base" latinLnBrk="0" hangingPunct="1">
-                <a:lnSpc>
-                  <a:spcPct val="100000"/>
-                </a:lnSpc>
-                <a:spcBef>
-                  <a:spcPct val="0"/>
-                </a:spcBef>
-                <a:spcAft>
-                  <a:spcPct val="0"/>
-                </a:spcAft>
-                <a:buClrTx/>
-                <a:buSzTx/>
-                <a:buFontTx/>
-                <a:buNone/>
-                <a:tabLst/>
-              </a:pPr>
-              <a:r>
-                <a:rPr kumimoji="0" lang="en-US" sz="2500" b="0" i="0" u="none" strike="noStrike" cap="none" normalizeH="0" baseline="0" dirty="0" smtClean="0">
-                  <a:ln>
-                    <a:noFill/>
-                  </a:ln>
-                  <a:solidFill>
-                    <a:srgbClr val="000000"/>
-                  </a:solidFill>
-                  <a:effectLst/>
-                  <a:latin typeface="Symbol" pitchFamily="18" charset="2"/>
-                  <a:cs typeface="Arial" pitchFamily="34" charset="0"/>
-                </a:rPr>
-                <a:t>b</a:t>
-              </a:r>
-              <a:endParaRPr kumimoji="0" lang="en-US" sz="1800" b="0" i="0" u="none" strike="noStrike" cap="none" normalizeH="0" baseline="0" dirty="0" smtClean="0">
+            </a:prstTxWarp>
+            <a:spAutoFit/>
+          </a:bodyPr>
+          <a:lstStyle/>
+          <a:p>
+            <a:pPr marL="0" marR="0" lvl="0" indent="0" algn="l" defTabSz="914400" rtl="0" eaLnBrk="1" fontAlgn="base" latinLnBrk="0" hangingPunct="1">
+              <a:lnSpc>
+                <a:spcPct val="100000"/>
+              </a:lnSpc>
+              <a:spcBef>
+                <a:spcPct val="0"/>
+              </a:spcBef>
+              <a:spcAft>
+                <a:spcPct val="0"/>
+              </a:spcAft>
+              <a:buClrTx/>
+              <a:buSzTx/>
+              <a:buFontTx/>
+              <a:buNone/>
+              <a:tabLst/>
+            </a:pPr>
+            <a:r>
+              <a:rPr kumimoji="0" lang="en-US" sz="2500" b="0" i="0" u="none" strike="noStrike" cap="none" normalizeH="0" baseline="0" dirty="0" smtClean="0">
                 <a:ln>
                   <a:noFill/>
                 </a:ln>
                 <a:solidFill>
-                  <a:schemeClr val="tx1"/>
+                  <a:srgbClr val="000000"/>
                 </a:solidFill>
                 <a:effectLst/>
-                <a:latin typeface="Arial" pitchFamily="34" charset="0"/>
+                <a:latin typeface="Symbol" pitchFamily="18" charset="2"/>
                 <a:cs typeface="Arial" pitchFamily="34" charset="0"/>
-              </a:endParaRPr>
-            </a:p>
-          </p:txBody>
-        </p:sp>
-        <p:sp>
-          <p:nvSpPr>
-            <p:cNvPr id="310286" name="Rectangle 42"/>
-            <p:cNvSpPr>
-              <a:spLocks noChangeArrowheads="1"/>
-            </p:cNvSpPr>
-            <p:nvPr/>
-          </p:nvSpPr>
-          <p:spPr bwMode="auto">
-            <a:xfrm>
-              <a:off x="4926013" y="3976688"/>
-              <a:ext cx="242888" cy="304800"/>
-            </a:xfrm>
-            <a:prstGeom prst="rect">
-              <a:avLst/>
-            </a:prstGeom>
-            <a:noFill/>
-            <a:ln>
-              <a:noFill/>
-            </a:ln>
-            <a:extLst>
-              <a:ext uri="{909E8E84-426E-40DD-AFC4-6F175D3DCCD1}">
-                <a14:hiddenFill xmlns:a14="http://schemas.microsoft.com/office/drawing/2010/main">
-                  <a:solidFill>
-                    <a:srgbClr val="FFFFFF"/>
-                  </a:solidFill>
-                </a14:hiddenFill>
-              </a:ext>
-              <a:ext uri="{91240B29-F687-4F45-9708-019B960494DF}">
-                <a14:hiddenLine xmlns:a14="http://schemas.microsoft.com/office/drawing/2010/main" w="9525">
-                  <a:solidFill>
-                    <a:srgbClr val="000000"/>
-                  </a:solidFill>
-                  <a:miter lim="800000"/>
-                  <a:headEnd/>
-                  <a:tailEnd/>
-                </a14:hiddenLine>
-              </a:ext>
-            </a:extLst>
-          </p:spPr>
-          <p:txBody>
-            <a:bodyPr vert="horz" wrap="none" lIns="0" tIns="0" rIns="0" bIns="0" numCol="1" anchor="t" anchorCtr="0" compatLnSpc="1">
-              <a:prstTxWarp prst="textNoShape">
-                <a:avLst/>
-              </a:prstTxWarp>
-              <a:spAutoFit/>
-            </a:bodyPr>
-            <a:lstStyle/>
-            <a:p>
-              <a:pPr marL="0" marR="0" lvl="0" indent="0" algn="l" defTabSz="914400" rtl="0" eaLnBrk="1" fontAlgn="base" latinLnBrk="0" hangingPunct="1">
-                <a:lnSpc>
-                  <a:spcPct val="100000"/>
-                </a:lnSpc>
-                <a:spcBef>
-                  <a:spcPct val="0"/>
-                </a:spcBef>
-                <a:spcAft>
-                  <a:spcPct val="0"/>
-                </a:spcAft>
-                <a:buClrTx/>
-                <a:buSzTx/>
-                <a:buFontTx/>
-                <a:buNone/>
-                <a:tabLst/>
-              </a:pPr>
-              <a:r>
-                <a:rPr kumimoji="0" lang="en-US" sz="1800" b="0" i="0" u="none" strike="noStrike" cap="none" normalizeH="0" baseline="0" smtClean="0">
-                  <a:ln>
-                    <a:noFill/>
-                  </a:ln>
-                  <a:solidFill>
-                    <a:srgbClr val="000000"/>
-                  </a:solidFill>
-                  <a:effectLst/>
-                  <a:latin typeface="Arial" pitchFamily="34" charset="0"/>
-                  <a:cs typeface="Arial" pitchFamily="34" charset="0"/>
-                </a:rPr>
-                <a:t>1</a:t>
-              </a:r>
-              <a:endParaRPr kumimoji="0" lang="en-US" sz="1800" b="0" i="0" u="none" strike="noStrike" cap="none" normalizeH="0" baseline="0" smtClean="0">
-                <a:ln>
-                  <a:noFill/>
-                </a:ln>
-                <a:solidFill>
-                  <a:schemeClr val="tx1"/>
-                </a:solidFill>
-                <a:effectLst/>
-                <a:latin typeface="Arial" pitchFamily="34" charset="0"/>
-                <a:cs typeface="Arial" pitchFamily="34" charset="0"/>
-              </a:endParaRPr>
-            </a:p>
-          </p:txBody>
-        </p:sp>
-      </p:grpSp>
+              </a:rPr>
+              <a:t>b</a:t>
+            </a:r>
+            <a:endParaRPr kumimoji="0" lang="en-US" sz="1800" b="0" i="0" u="none" strike="noStrike" cap="none" normalizeH="0" baseline="0" dirty="0" smtClean="0">
+              <a:ln>
+                <a:noFill/>
+              </a:ln>
+              <a:solidFill>
+                <a:schemeClr val="tx1"/>
+              </a:solidFill>
+              <a:effectLst/>
+              <a:latin typeface="Arial" pitchFamily="34" charset="0"/>
+              <a:cs typeface="Arial" pitchFamily="34" charset="0"/>
+            </a:endParaRPr>
+          </a:p>
+        </p:txBody>
+      </p:sp>
       <p:grpSp>
         <p:nvGrpSpPr>
           <p:cNvPr id="310332" name="Group 310331"/>
@@ -24400,16 +24127,16 @@
       </p:grpSp>
       <p:grpSp>
         <p:nvGrpSpPr>
-          <p:cNvPr id="310323" name="Group 310322"/>
+          <p:cNvPr id="2" name="Group 1"/>
           <p:cNvGrpSpPr/>
           <p:nvPr/>
         </p:nvGrpSpPr>
         <p:grpSpPr>
           <a:xfrm>
             <a:off x="5891213" y="5011738"/>
-            <a:ext cx="1022350" cy="487363"/>
-            <a:chOff x="4748213" y="5011738"/>
-            <a:chExt cx="1022350" cy="487363"/>
+            <a:ext cx="854075" cy="487363"/>
+            <a:chOff x="5891213" y="5011738"/>
+            <a:chExt cx="854075" cy="487363"/>
           </a:xfrm>
         </p:grpSpPr>
         <p:sp>
@@ -24422,7 +24149,7 @@
           </p:nvSpPr>
           <p:spPr bwMode="auto">
             <a:xfrm>
-              <a:off x="4748213" y="5011738"/>
+              <a:off x="5891213" y="5011738"/>
               <a:ext cx="422275" cy="487363"/>
             </a:xfrm>
             <a:prstGeom prst="rect">
@@ -24478,7 +24205,7 @@
                 <a:tabLst/>
               </a:pPr>
               <a:r>
-                <a:rPr kumimoji="0" lang="en-US" sz="2500" b="0" i="0" u="none" strike="noStrike" cap="none" normalizeH="0" baseline="0" smtClean="0">
+                <a:rPr kumimoji="0" lang="en-US" sz="2500" b="0" i="0" u="none" strike="noStrike" cap="none" normalizeH="0" baseline="0" dirty="0" smtClean="0">
                   <a:ln>
                     <a:noFill/>
                   </a:ln>
@@ -24491,100 +24218,7 @@
                 </a:rPr>
                 <a:t>b</a:t>
               </a:r>
-              <a:endParaRPr kumimoji="0" lang="en-US" sz="1800" b="0" i="0" u="none" strike="noStrike" cap="none" normalizeH="0" baseline="0" smtClean="0">
-                <a:ln>
-                  <a:noFill/>
-                </a:ln>
-                <a:solidFill>
-                  <a:schemeClr val="tx1"/>
-                </a:solidFill>
-                <a:effectLst/>
-                <a:latin typeface="Arial" pitchFamily="34" charset="0"/>
-                <a:cs typeface="Arial" pitchFamily="34" charset="0"/>
-              </a:endParaRPr>
-            </a:p>
-          </p:txBody>
-        </p:sp>
-        <p:sp>
-          <p:nvSpPr>
-            <p:cNvPr id="310296" name="Rectangle 52"/>
-            <p:cNvSpPr>
-              <a:spLocks noChangeArrowheads="1"/>
-            </p:cNvSpPr>
-            <p:nvPr/>
-          </p:nvSpPr>
-          <p:spPr bwMode="auto">
-            <a:xfrm>
-              <a:off x="4926013" y="5194300"/>
-              <a:ext cx="242888" cy="304800"/>
-            </a:xfrm>
-            <a:prstGeom prst="rect">
-              <a:avLst/>
-            </a:prstGeom>
-            <a:noFill/>
-            <a:ln>
-              <a:noFill/>
-            </a:ln>
-            <a:extLst>
-              <a:ext uri="{909E8E84-426E-40DD-AFC4-6F175D3DCCD1}">
-                <a14:hiddenFill xmlns:a14="http://schemas.microsoft.com/office/drawing/2010/main">
-                  <a:solidFill>
-                    <a:srgbClr val="FFFFFF"/>
-                  </a:solidFill>
-                </a14:hiddenFill>
-              </a:ext>
-              <a:ext uri="{91240B29-F687-4F45-9708-019B960494DF}">
-                <a14:hiddenLine xmlns:a14="http://schemas.microsoft.com/office/drawing/2010/main" w="9525">
-                  <a:solidFill>
-                    <a:srgbClr val="000000"/>
-                  </a:solidFill>
-                  <a:miter lim="800000"/>
-                  <a:headEnd/>
-                  <a:tailEnd/>
-                </a14:hiddenLine>
-              </a:ext>
-            </a:extLst>
-          </p:spPr>
-          <p:txBody>
-            <a:bodyPr vert="horz" wrap="none" lIns="0" tIns="0" rIns="0" bIns="0" numCol="1" anchor="t" anchorCtr="0" compatLnSpc="1">
-              <a:prstTxWarp prst="textNoShape">
-                <a:avLst/>
-              </a:prstTxWarp>
-              <a:spAutoFit/>
-            </a:bodyPr>
-            <a:lstStyle/>
-            <a:p>
-              <a:pPr marL="0" marR="0" lvl="0" indent="0" algn="l" defTabSz="914400" rtl="0" eaLnBrk="1" fontAlgn="base" latinLnBrk="0" hangingPunct="1">
-                <a:lnSpc>
-                  <a:spcPct val="100000"/>
-                </a:lnSpc>
-                <a:spcBef>
-                  <a:spcPct val="0"/>
-                </a:spcBef>
-                <a:spcAft>
-                  <a:spcPct val="0"/>
-                </a:spcAft>
-                <a:buClrTx/>
-                <a:buSzTx/>
-                <a:buFontTx/>
-                <a:buNone/>
-                <a:tabLst/>
-              </a:pPr>
-              <a:r>
-                <a:rPr kumimoji="0" lang="en-US" sz="1800" b="0" i="0" u="none" strike="noStrike" cap="none" normalizeH="0" baseline="0" smtClean="0">
-                  <a:ln>
-                    <a:noFill/>
-                  </a:ln>
-                  <a:solidFill>
-                    <a:srgbClr val="0000FF"/>
-                  </a:solidFill>
-                  <a:effectLst/>
-                  <a:latin typeface="Arial" pitchFamily="34" charset="0"/>
-                  <a:cs typeface="Arial" pitchFamily="34" charset="0"/>
-                </a:rPr>
-                <a:t>1</a:t>
-              </a:r>
-              <a:endParaRPr kumimoji="0" lang="en-US" sz="1800" b="0" i="0" u="none" strike="noStrike" cap="none" normalizeH="0" baseline="0" smtClean="0">
+              <a:endParaRPr kumimoji="0" lang="en-US" sz="1800" b="0" i="0" u="none" strike="noStrike" cap="none" normalizeH="0" baseline="0" dirty="0" smtClean="0">
                 <a:ln>
                   <a:noFill/>
                 </a:ln>
@@ -24608,7 +24242,7 @@
           </p:nvSpPr>
           <p:spPr bwMode="auto">
             <a:xfrm>
-              <a:off x="5121275" y="5011738"/>
+              <a:off x="6096000" y="5011738"/>
               <a:ext cx="406400" cy="487363"/>
             </a:xfrm>
             <a:prstGeom prst="rect">
@@ -24701,7 +24335,7 @@
           </p:nvSpPr>
           <p:spPr bwMode="auto">
             <a:xfrm>
-              <a:off x="5381625" y="5011738"/>
+              <a:off x="6356350" y="5011738"/>
               <a:ext cx="357188" cy="487363"/>
             </a:xfrm>
             <a:prstGeom prst="rect">
@@ -24794,7 +24428,7 @@
           </p:nvSpPr>
           <p:spPr bwMode="auto">
             <a:xfrm>
-              <a:off x="5527675" y="5194300"/>
+              <a:off x="6502400" y="5194300"/>
               <a:ext cx="242888" cy="304800"/>
             </a:xfrm>
             <a:prstGeom prst="rect">
@@ -24850,7 +24484,7 @@
                 <a:tabLst/>
               </a:pPr>
               <a:r>
-                <a:rPr kumimoji="0" lang="en-US" sz="1800" b="0" i="0" u="none" strike="noStrike" cap="none" normalizeH="0" baseline="0" smtClean="0">
+                <a:rPr kumimoji="0" lang="en-US" sz="1800" b="0" i="0" u="none" strike="noStrike" cap="none" normalizeH="0" baseline="0" dirty="0" smtClean="0">
                   <a:ln>
                     <a:noFill/>
                   </a:ln>
@@ -24863,7 +24497,7 @@
                 </a:rPr>
                 <a:t>1</a:t>
               </a:r>
-              <a:endParaRPr kumimoji="0" lang="en-US" sz="1800" b="0" i="0" u="none" strike="noStrike" cap="none" normalizeH="0" baseline="0" smtClean="0">
+              <a:endParaRPr kumimoji="0" lang="en-US" sz="1800" b="0" i="0" u="none" strike="noStrike" cap="none" normalizeH="0" baseline="0" dirty="0" smtClean="0">
                 <a:ln>
                   <a:noFill/>
                 </a:ln>
@@ -26882,28 +26516,45 @@
               </a:rPr>
               <a:t>b</a:t>
             </a:r>
+            <a:endParaRPr lang="en-US" sz="2400" b="0" baseline="-25000" dirty="0" smtClean="0">
+              <a:latin typeface="Symbol" pitchFamily="18" charset="2"/>
+            </a:endParaRPr>
+          </a:p>
+          <a:p>
+            <a:pPr lvl="1"/>
+            <a:r>
+              <a:rPr lang="en-US" sz="2400" b="0" dirty="0"/>
+              <a:t> </a:t>
+            </a:r>
+            <a:r>
+              <a:rPr lang="en-US" sz="2400" b="0" dirty="0" smtClean="0">
+                <a:latin typeface="Symbol" pitchFamily="18" charset="2"/>
+              </a:rPr>
+              <a:t>a</a:t>
+            </a:r>
+            <a:r>
+              <a:rPr lang="en-US" sz="2400" b="0" dirty="0" smtClean="0"/>
+              <a:t> + </a:t>
+            </a:r>
+            <a:r>
+              <a:rPr lang="en-US" sz="2400" b="0" dirty="0" smtClean="0">
+                <a:latin typeface="Symbol" pitchFamily="18" charset="2"/>
+              </a:rPr>
+              <a:t>d</a:t>
+            </a:r>
             <a:r>
               <a:rPr lang="en-US" sz="2400" b="0" baseline="-25000" dirty="0" smtClean="0">
                 <a:latin typeface="Symbol" pitchFamily="18" charset="2"/>
               </a:rPr>
               <a:t>1</a:t>
             </a:r>
+            <a:endParaRPr lang="en-US" sz="2400" b="0" dirty="0" smtClean="0"/>
           </a:p>
           <a:p>
             <a:pPr lvl="1"/>
             <a:r>
-              <a:rPr lang="en-US" sz="2400" b="0" dirty="0"/>
+              <a:rPr lang="en-US" sz="2400" b="0" dirty="0" smtClean="0"/>
               <a:t> </a:t>
-            </a:r>
-            <a:r>
-              <a:rPr lang="en-US" sz="2400" b="0" dirty="0" smtClean="0">
-                <a:latin typeface="Symbol" pitchFamily="18" charset="2"/>
-              </a:rPr>
-              <a:t>a</a:t>
-            </a:r>
-            <a:r>
-              <a:rPr lang="en-US" sz="2400" b="0" dirty="0" smtClean="0"/>
-              <a:t> + </a:t>
             </a:r>
             <a:r>
               <a:rPr lang="en-US" sz="2400" b="0" dirty="0" smtClean="0">
@@ -26922,46 +26573,20 @@
           <a:p>
             <a:pPr lvl="1"/>
             <a:r>
-              <a:rPr lang="en-US" sz="2400" b="0" dirty="0" smtClean="0"/>
+              <a:rPr lang="en-US" sz="2400" b="0" dirty="0"/>
               <a:t> </a:t>
             </a:r>
             <a:r>
               <a:rPr lang="en-US" sz="2400" b="0" dirty="0" smtClean="0">
                 <a:latin typeface="Symbol" pitchFamily="18" charset="2"/>
               </a:rPr>
-              <a:t>d</a:t>
-            </a:r>
-            <a:r>
-              <a:rPr lang="en-US" sz="2400" b="0" baseline="-25000" dirty="0" smtClean="0">
-                <a:latin typeface="Symbol" pitchFamily="18" charset="2"/>
-              </a:rPr>
-              <a:t>1</a:t>
-            </a:r>
-            <a:endParaRPr lang="en-US" sz="2400" b="0" dirty="0" smtClean="0"/>
-          </a:p>
-          <a:p>
-            <a:pPr lvl="1"/>
-            <a:r>
-              <a:rPr lang="en-US" sz="2400" b="0" dirty="0"/>
-              <a:t> </a:t>
+              <a:t>b </a:t>
             </a:r>
             <a:r>
               <a:rPr lang="en-US" sz="2400" b="0" dirty="0" smtClean="0">
                 <a:latin typeface="Symbol" pitchFamily="18" charset="2"/>
               </a:rPr>
-              <a:t>b</a:t>
-            </a:r>
-            <a:r>
-              <a:rPr lang="en-US" sz="2400" b="0" baseline="-25000" dirty="0" smtClean="0">
-                <a:latin typeface="Symbol" pitchFamily="18" charset="2"/>
-              </a:rPr>
-              <a:t>1</a:t>
-            </a:r>
-            <a:r>
-              <a:rPr lang="en-US" sz="2400" b="0" dirty="0" smtClean="0">
-                <a:latin typeface="Symbol" pitchFamily="18" charset="2"/>
-              </a:rPr>
-              <a:t> + g</a:t>
+              <a:t>+ g</a:t>
             </a:r>
             <a:r>
               <a:rPr lang="en-US" sz="2400" b="0" baseline="-25000" dirty="0" smtClean="0">
@@ -27283,7 +26908,7 @@
                             </p:stCondLst>
                             <p:childTnLst>
                               <p:par>
-                                <p:cTn id="27" presetID="1" presetClass="entr" presetSubtype="0" fill="hold" nodeType="afterEffect">
+                                <p:cTn id="27" presetID="1" presetClass="entr" presetSubtype="0" fill="hold" grpId="0" nodeType="afterEffect">
                                   <p:stCondLst>
                                     <p:cond delay="0"/>
                                   </p:stCondLst>
@@ -27296,7 +26921,7 @@
                                           </p:stCondLst>
                                         </p:cTn>
                                         <p:tgtEl>
-                                          <p:spTgt spid="310326"/>
+                                          <p:spTgt spid="310285"/>
                                         </p:tgtEl>
                                         <p:attrNameLst>
                                           <p:attrName>style.visibility</p:attrName>
@@ -27710,7 +27335,7 @@
                                           </p:stCondLst>
                                         </p:cTn>
                                         <p:tgtEl>
-                                          <p:spTgt spid="310323"/>
+                                          <p:spTgt spid="2"/>
                                         </p:tgtEl>
                                         <p:attrNameLst>
                                           <p:attrName>style.visibility</p:attrName>
@@ -27987,6 +27612,7 @@
     </p:tnLst>
     <p:bldLst>
       <p:bldP spid="21" grpId="0"/>
+      <p:bldP spid="310285" grpId="0"/>
       <p:bldP spid="101" grpId="0" uiExpand="1" build="p"/>
     </p:bldLst>
   </p:timing>

</xml_diff>